<commit_message>
Unit tests all passing
</commit_message>
<xml_diff>
--- a/MockingFrameworks.pptx
+++ b/MockingFrameworks.pptx
@@ -158,7 +158,7 @@
   <pc:docChgLst>
     <pc:chgData name="Daniel Beus" userId="25764f9dca0923f9" providerId="LiveId" clId="{9F1C6964-22C7-4590-9B7E-A0F8CD3E82E9}"/>
     <pc:docChg chg="undo custSel addSld delSld modSld modSection">
-      <pc:chgData name="Daniel Beus" userId="25764f9dca0923f9" providerId="LiveId" clId="{9F1C6964-22C7-4590-9B7E-A0F8CD3E82E9}" dt="2018-04-12T18:46:36.588" v="2489" actId="478"/>
+      <pc:chgData name="Daniel Beus" userId="25764f9dca0923f9" providerId="LiveId" clId="{9F1C6964-22C7-4590-9B7E-A0F8CD3E82E9}" dt="2018-04-12T21:43:21.549" v="2581" actId="20577"/>
       <pc:docMkLst>
         <pc:docMk/>
       </pc:docMkLst>
@@ -225,7 +225,7 @@
         </pc:spChg>
       </pc:sldChg>
       <pc:sldChg chg="modSp add">
-        <pc:chgData name="Daniel Beus" userId="25764f9dca0923f9" providerId="LiveId" clId="{9F1C6964-22C7-4590-9B7E-A0F8CD3E82E9}" dt="2018-04-12T17:57:10.665" v="831" actId="20577"/>
+        <pc:chgData name="Daniel Beus" userId="25764f9dca0923f9" providerId="LiveId" clId="{9F1C6964-22C7-4590-9B7E-A0F8CD3E82E9}" dt="2018-04-12T21:43:21.549" v="2581" actId="20577"/>
         <pc:sldMkLst>
           <pc:docMk/>
           <pc:sldMk cId="2652214772" sldId="261"/>
@@ -255,7 +255,7 @@
           </ac:spMkLst>
         </pc:spChg>
         <pc:spChg chg="mod">
-          <ac:chgData name="Daniel Beus" userId="25764f9dca0923f9" providerId="LiveId" clId="{9F1C6964-22C7-4590-9B7E-A0F8CD3E82E9}" dt="2018-04-12T17:57:10.665" v="831" actId="20577"/>
+          <ac:chgData name="Daniel Beus" userId="25764f9dca0923f9" providerId="LiveId" clId="{9F1C6964-22C7-4590-9B7E-A0F8CD3E82E9}" dt="2018-04-12T21:43:21.549" v="2581" actId="20577"/>
           <ac:spMkLst>
             <pc:docMk/>
             <pc:sldMk cId="2652214772" sldId="261"/>
@@ -390,14 +390,14 @@
         </pc:spChg>
       </pc:sldChg>
       <pc:sldChg chg="add">
-        <pc:chgData name="Daniel Beus" userId="25764f9dca0923f9" providerId="LiveId" clId="{9F1C6964-22C7-4590-9B7E-A0F8CD3E82E9}" dt="2018-04-12T18:31:29.292" v="1543"/>
+        <pc:chgData name="Daniel Beus" userId="25764f9dca0923f9" providerId="LiveId" clId="{9F1C6964-22C7-4590-9B7E-A0F8CD3E82E9}" dt="2018-04-12T18:31:29.292" v="1543" actId="478"/>
         <pc:sldMkLst>
           <pc:docMk/>
           <pc:sldMk cId="2173903255" sldId="264"/>
         </pc:sldMkLst>
       </pc:sldChg>
       <pc:sldChg chg="addSp modSp add modAnim">
-        <pc:chgData name="Daniel Beus" userId="25764f9dca0923f9" providerId="LiveId" clId="{9F1C6964-22C7-4590-9B7E-A0F8CD3E82E9}" dt="2018-04-12T18:42:31.082" v="2065"/>
+        <pc:chgData name="Daniel Beus" userId="25764f9dca0923f9" providerId="LiveId" clId="{9F1C6964-22C7-4590-9B7E-A0F8CD3E82E9}" dt="2018-04-12T18:42:31.082" v="2065" actId="478"/>
         <pc:sldMkLst>
           <pc:docMk/>
           <pc:sldMk cId="2306391894" sldId="265"/>
@@ -8869,11 +8869,11 @@
   <p:clrMapOvr>
     <a:masterClrMapping/>
   </p:clrMapOvr>
-  <mc:AlternateContent xmlns:mc="http://schemas.openxmlformats.org/markup-compatibility/2006">
-    <mc:Choice xmlns:p14="http://schemas.microsoft.com/office/powerpoint/2010/main" Requires="p14">
+  <mc:AlternateContent xmlns:mc="http://schemas.openxmlformats.org/markup-compatibility/2006" xmlns:p14="http://schemas.microsoft.com/office/powerpoint/2010/main">
+    <mc:Choice Requires="p14">
       <p:transition p14:dur="10"/>
     </mc:Choice>
-    <mc:Fallback>
+    <mc:Fallback xmlns="">
       <p:transition/>
     </mc:Fallback>
   </mc:AlternateContent>
@@ -10677,11 +10677,11 @@
   <p:clrMapOvr>
     <a:masterClrMapping/>
   </p:clrMapOvr>
-  <mc:AlternateContent xmlns:mc="http://schemas.openxmlformats.org/markup-compatibility/2006">
-    <mc:Choice xmlns:p14="http://schemas.microsoft.com/office/powerpoint/2010/main" Requires="p14">
+  <mc:AlternateContent xmlns:mc="http://schemas.openxmlformats.org/markup-compatibility/2006" xmlns:p14="http://schemas.microsoft.com/office/powerpoint/2010/main">
+    <mc:Choice Requires="p14">
       <p:transition p14:dur="10"/>
     </mc:Choice>
-    <mc:Fallback>
+    <mc:Fallback xmlns="">
       <p:transition/>
     </mc:Fallback>
   </mc:AlternateContent>
@@ -12704,6 +12704,17 @@
           <a:p>
             <a:r>
               <a:rPr lang="en-US" dirty="0"/>
+              <a:t>Extension methods can be called an anything, but throw exceptions if </a:t>
+            </a:r>
+            <a:r>
+              <a:rPr lang="en-US"/>
+              <a:t>not mocks</a:t>
+            </a:r>
+            <a:endParaRPr lang="en-US" dirty="0"/>
+          </a:p>
+          <a:p>
+            <a:r>
+              <a:rPr lang="en-US" dirty="0"/>
               <a:t>Checking calls to properties requires throw-away variables</a:t>
             </a:r>
           </a:p>
@@ -13756,11 +13767,11 @@
   <p:clrMapOvr>
     <a:masterClrMapping/>
   </p:clrMapOvr>
-  <mc:AlternateContent xmlns:mc="http://schemas.openxmlformats.org/markup-compatibility/2006">
-    <mc:Choice xmlns:p14="http://schemas.microsoft.com/office/powerpoint/2010/main" Requires="p14">
+  <mc:AlternateContent xmlns:mc="http://schemas.openxmlformats.org/markup-compatibility/2006" xmlns:p14="http://schemas.microsoft.com/office/powerpoint/2010/main">
+    <mc:Choice Requires="p14">
       <p:transition p14:dur="10"/>
     </mc:Choice>
-    <mc:Fallback>
+    <mc:Fallback xmlns="">
       <p:transition/>
     </mc:Fallback>
   </mc:AlternateContent>
@@ -15272,11 +15283,11 @@
   <p:clrMapOvr>
     <a:masterClrMapping/>
   </p:clrMapOvr>
-  <mc:AlternateContent xmlns:mc="http://schemas.openxmlformats.org/markup-compatibility/2006">
-    <mc:Choice xmlns:p14="http://schemas.microsoft.com/office/powerpoint/2010/main" Requires="p14">
+  <mc:AlternateContent xmlns:mc="http://schemas.openxmlformats.org/markup-compatibility/2006" xmlns:p14="http://schemas.microsoft.com/office/powerpoint/2010/main">
+    <mc:Choice Requires="p14">
       <p:transition p14:dur="10"/>
     </mc:Choice>
-    <mc:Fallback>
+    <mc:Fallback xmlns="">
       <p:transition/>
     </mc:Fallback>
   </mc:AlternateContent>

</xml_diff>